<commit_message>
Update the presentation slides and add summary presentation slide for Dr. Yu
</commit_message>
<xml_diff>
--- a/documents/slides/NERSC_TF_Sync_20180803_backupslides.pptx
+++ b/documents/slides/NERSC_TF_Sync_20180803_backupslides.pptx
@@ -259,7 +259,7 @@
             <a:fld id="{EA3D68A3-9B80-584C-9BEB-F8B43CF5A651}" type="datetime1">
               <a:rPr lang="en-US" sz="900" smtClean="0"/>
               <a:pPr/>
-              <a:t>8/2/18</a:t>
+              <a:t>8/16/2018</a:t>
             </a:fld>
             <a:endParaRPr lang="en-US" sz="900"/>
           </a:p>
@@ -430,7 +430,7 @@
             <a:fld id="{39FEAFF0-7375-1D4A-A389-D6238357B121}" type="datetime1">
               <a:rPr lang="en-US" smtClean="0"/>
               <a:pPr/>
-              <a:t>8/2/18</a:t>
+              <a:t>8/16/2018</a:t>
             </a:fld>
             <a:endParaRPr lang="en-US"/>
           </a:p>
@@ -789,7 +789,7 @@
             <a:fld id="{39FEAFF0-7375-1D4A-A389-D6238357B121}" type="datetime1">
               <a:rPr lang="en-US" smtClean="0"/>
               <a:pPr/>
-              <a:t>8/2/18</a:t>
+              <a:t>8/16/2018</a:t>
             </a:fld>
             <a:endParaRPr lang="en-US"/>
           </a:p>
@@ -920,7 +920,7 @@
             <a:fld id="{39FEAFF0-7375-1D4A-A389-D6238357B121}" type="datetime1">
               <a:rPr lang="en-US" smtClean="0"/>
               <a:pPr/>
-              <a:t>8/2/18</a:t>
+              <a:t>8/16/2018</a:t>
             </a:fld>
             <a:endParaRPr lang="en-US"/>
           </a:p>
@@ -1139,7 +1139,7 @@
             <a:fld id="{39FEAFF0-7375-1D4A-A389-D6238357B121}" type="datetime1">
               <a:rPr lang="en-US" smtClean="0"/>
               <a:pPr/>
-              <a:t>8/2/18</a:t>
+              <a:t>8/16/2018</a:t>
             </a:fld>
             <a:endParaRPr lang="en-US"/>
           </a:p>
@@ -1270,7 +1270,7 @@
             <a:fld id="{39FEAFF0-7375-1D4A-A389-D6238357B121}" type="datetime1">
               <a:rPr lang="en-US" smtClean="0"/>
               <a:pPr/>
-              <a:t>8/2/18</a:t>
+              <a:t>8/16/2018</a:t>
             </a:fld>
             <a:endParaRPr lang="en-US"/>
           </a:p>
@@ -1489,7 +1489,7 @@
             <a:fld id="{39FEAFF0-7375-1D4A-A389-D6238357B121}" type="datetime1">
               <a:rPr lang="en-US" smtClean="0"/>
               <a:pPr/>
-              <a:t>8/2/18</a:t>
+              <a:t>8/16/2018</a:t>
             </a:fld>
             <a:endParaRPr lang="en-US"/>
           </a:p>
@@ -1620,7 +1620,7 @@
             <a:fld id="{39FEAFF0-7375-1D4A-A389-D6238357B121}" type="datetime1">
               <a:rPr lang="en-US" smtClean="0"/>
               <a:pPr/>
-              <a:t>8/2/18</a:t>
+              <a:t>8/16/2018</a:t>
             </a:fld>
             <a:endParaRPr lang="en-US"/>
           </a:p>
@@ -1751,7 +1751,7 @@
             <a:fld id="{39FEAFF0-7375-1D4A-A389-D6238357B121}" type="datetime1">
               <a:rPr lang="en-US" smtClean="0"/>
               <a:pPr/>
-              <a:t>8/2/18</a:t>
+              <a:t>8/16/2018</a:t>
             </a:fld>
             <a:endParaRPr lang="en-US"/>
           </a:p>
@@ -1882,7 +1882,7 @@
             <a:fld id="{39FEAFF0-7375-1D4A-A389-D6238357B121}" type="datetime1">
               <a:rPr lang="en-US" smtClean="0"/>
               <a:pPr/>
-              <a:t>8/2/18</a:t>
+              <a:t>8/16/2018</a:t>
             </a:fld>
             <a:endParaRPr lang="en-US"/>
           </a:p>
@@ -2204,7 +2204,7 @@
             <a:fld id="{D897A66F-DFB6-CB44-8B31-7FAB7C20B0C7}" type="datetime4">
               <a:rPr lang="en-US" smtClean="0"/>
               <a:pPr/>
-              <a:t>August 2, 2018</a:t>
+              <a:t>August 16, 2018</a:t>
             </a:fld>
             <a:endParaRPr lang="en-US" dirty="0"/>
           </a:p>
@@ -6438,7 +6438,7 @@
           <p:cNvPr id="2" name="Title 1">
             <a:extLst>
               <a:ext uri="{FF2B5EF4-FFF2-40B4-BE49-F238E27FC236}">
-                <a16:creationId xmlns:a16="http://schemas.microsoft.com/office/drawing/2014/main" id="{553D7AE0-7F1A-C34F-8A50-58DE17400BAB}"/>
+                <a16:creationId xmlns:a16="http://schemas.microsoft.com/office/drawing/2014/main" xmlns="" id="{553D7AE0-7F1A-C34F-8A50-58DE17400BAB}"/>
               </a:ext>
             </a:extLst>
           </p:cNvPr>
@@ -6466,7 +6466,7 @@
           <p:cNvPr id="4" name="Slide Number Placeholder 3">
             <a:extLst>
               <a:ext uri="{FF2B5EF4-FFF2-40B4-BE49-F238E27FC236}">
-                <a16:creationId xmlns:a16="http://schemas.microsoft.com/office/drawing/2014/main" id="{1940B822-519F-1341-99E5-38ED4793594B}"/>
+                <a16:creationId xmlns:a16="http://schemas.microsoft.com/office/drawing/2014/main" xmlns="" id="{1940B822-519F-1341-99E5-38ED4793594B}"/>
               </a:ext>
             </a:extLst>
           </p:cNvPr>
@@ -6504,7 +6504,7 @@
           <p:cNvPr id="5" name="Picture 4">
             <a:extLst>
               <a:ext uri="{FF2B5EF4-FFF2-40B4-BE49-F238E27FC236}">
-                <a16:creationId xmlns:a16="http://schemas.microsoft.com/office/drawing/2014/main" id="{02527016-4CBC-CA4B-B70B-4D790395B033}"/>
+                <a16:creationId xmlns:a16="http://schemas.microsoft.com/office/drawing/2014/main" xmlns="" id="{02527016-4CBC-CA4B-B70B-4D790395B033}"/>
               </a:ext>
             </a:extLst>
           </p:cNvPr>
@@ -7001,7 +7001,7 @@
           <p:cNvPr id="2" name="Title 1">
             <a:extLst>
               <a:ext uri="{FF2B5EF4-FFF2-40B4-BE49-F238E27FC236}">
-                <a16:creationId xmlns:a16="http://schemas.microsoft.com/office/drawing/2014/main" id="{553D7AE0-7F1A-C34F-8A50-58DE17400BAB}"/>
+                <a16:creationId xmlns:a16="http://schemas.microsoft.com/office/drawing/2014/main" xmlns="" id="{553D7AE0-7F1A-C34F-8A50-58DE17400BAB}"/>
               </a:ext>
             </a:extLst>
           </p:cNvPr>
@@ -7029,7 +7029,7 @@
           <p:cNvPr id="4" name="Slide Number Placeholder 3">
             <a:extLst>
               <a:ext uri="{FF2B5EF4-FFF2-40B4-BE49-F238E27FC236}">
-                <a16:creationId xmlns:a16="http://schemas.microsoft.com/office/drawing/2014/main" id="{1940B822-519F-1341-99E5-38ED4793594B}"/>
+                <a16:creationId xmlns:a16="http://schemas.microsoft.com/office/drawing/2014/main" xmlns="" id="{1940B822-519F-1341-99E5-38ED4793594B}"/>
               </a:ext>
             </a:extLst>
           </p:cNvPr>
@@ -7067,7 +7067,7 @@
           <p:cNvPr id="12" name="Picture 11">
             <a:extLst>
               <a:ext uri="{FF2B5EF4-FFF2-40B4-BE49-F238E27FC236}">
-                <a16:creationId xmlns:a16="http://schemas.microsoft.com/office/drawing/2014/main" id="{74F6250A-B8D9-6E45-87E8-490D812A1B41}"/>
+                <a16:creationId xmlns:a16="http://schemas.microsoft.com/office/drawing/2014/main" xmlns="" id="{74F6250A-B8D9-6E45-87E8-490D812A1B41}"/>
               </a:ext>
             </a:extLst>
           </p:cNvPr>
@@ -7097,7 +7097,7 @@
           <p:cNvPr id="14" name="Picture 13">
             <a:extLst>
               <a:ext uri="{FF2B5EF4-FFF2-40B4-BE49-F238E27FC236}">
-                <a16:creationId xmlns:a16="http://schemas.microsoft.com/office/drawing/2014/main" id="{A5C7AD6C-B250-DD45-BCAC-F2AA4547D33E}"/>
+                <a16:creationId xmlns:a16="http://schemas.microsoft.com/office/drawing/2014/main" xmlns="" id="{A5C7AD6C-B250-DD45-BCAC-F2AA4547D33E}"/>
               </a:ext>
             </a:extLst>
           </p:cNvPr>
@@ -7127,7 +7127,7 @@
           <p:cNvPr id="15" name="TextBox 14">
             <a:extLst>
               <a:ext uri="{FF2B5EF4-FFF2-40B4-BE49-F238E27FC236}">
-                <a16:creationId xmlns:a16="http://schemas.microsoft.com/office/drawing/2014/main" id="{A3F1A404-3EAC-D94D-85B4-5F048EE5F9A6}"/>
+                <a16:creationId xmlns:a16="http://schemas.microsoft.com/office/drawing/2014/main" xmlns="" id="{A3F1A404-3EAC-D94D-85B4-5F048EE5F9A6}"/>
               </a:ext>
             </a:extLst>
           </p:cNvPr>
@@ -7163,7 +7163,7 @@
           <p:cNvPr id="16" name="TextBox 15">
             <a:extLst>
               <a:ext uri="{FF2B5EF4-FFF2-40B4-BE49-F238E27FC236}">
-                <a16:creationId xmlns:a16="http://schemas.microsoft.com/office/drawing/2014/main" id="{3A4FB94A-2539-5E46-9E7B-95C1F1A7971B}"/>
+                <a16:creationId xmlns:a16="http://schemas.microsoft.com/office/drawing/2014/main" xmlns="" id="{3A4FB94A-2539-5E46-9E7B-95C1F1A7971B}"/>
               </a:ext>
             </a:extLst>
           </p:cNvPr>
@@ -7229,7 +7229,7 @@
           <p:cNvPr id="2" name="Title 1">
             <a:extLst>
               <a:ext uri="{FF2B5EF4-FFF2-40B4-BE49-F238E27FC236}">
-                <a16:creationId xmlns:a16="http://schemas.microsoft.com/office/drawing/2014/main" id="{553D7AE0-7F1A-C34F-8A50-58DE17400BAB}"/>
+                <a16:creationId xmlns:a16="http://schemas.microsoft.com/office/drawing/2014/main" xmlns="" id="{553D7AE0-7F1A-C34F-8A50-58DE17400BAB}"/>
               </a:ext>
             </a:extLst>
           </p:cNvPr>
@@ -7240,9 +7240,16 @@
             <p:ph type="title"/>
           </p:nvPr>
         </p:nvSpPr>
-        <p:spPr/>
-        <p:txBody>
-          <a:bodyPr/>
+        <p:spPr>
+          <a:xfrm>
+            <a:off x="360342" y="134902"/>
+            <a:ext cx="7228458" cy="577109"/>
+          </a:xfrm>
+        </p:spPr>
+        <p:txBody>
+          <a:bodyPr>
+            <a:normAutofit fontScale="90000"/>
+          </a:bodyPr>
           <a:lstStyle/>
           <a:p>
             <a:r>
@@ -7257,7 +7264,7 @@
           <p:cNvPr id="4" name="Slide Number Placeholder 3">
             <a:extLst>
               <a:ext uri="{FF2B5EF4-FFF2-40B4-BE49-F238E27FC236}">
-                <a16:creationId xmlns:a16="http://schemas.microsoft.com/office/drawing/2014/main" id="{1940B822-519F-1341-99E5-38ED4793594B}"/>
+                <a16:creationId xmlns:a16="http://schemas.microsoft.com/office/drawing/2014/main" xmlns="" id="{1940B822-519F-1341-99E5-38ED4793594B}"/>
               </a:ext>
             </a:extLst>
           </p:cNvPr>
@@ -7295,7 +7302,7 @@
           <p:cNvPr id="8" name="Picture 7">
             <a:extLst>
               <a:ext uri="{FF2B5EF4-FFF2-40B4-BE49-F238E27FC236}">
-                <a16:creationId xmlns:a16="http://schemas.microsoft.com/office/drawing/2014/main" id="{F67961A0-7848-824F-B155-F30CC6D1C159}"/>
+                <a16:creationId xmlns:a16="http://schemas.microsoft.com/office/drawing/2014/main" xmlns="" id="{F67961A0-7848-824F-B155-F30CC6D1C159}"/>
               </a:ext>
             </a:extLst>
           </p:cNvPr>
@@ -7325,7 +7332,7 @@
           <p:cNvPr id="10" name="Picture 9">
             <a:extLst>
               <a:ext uri="{FF2B5EF4-FFF2-40B4-BE49-F238E27FC236}">
-                <a16:creationId xmlns:a16="http://schemas.microsoft.com/office/drawing/2014/main" id="{3018F2E4-13CA-C845-BBA9-071C9D7C4935}"/>
+                <a16:creationId xmlns:a16="http://schemas.microsoft.com/office/drawing/2014/main" xmlns="" id="{3018F2E4-13CA-C845-BBA9-071C9D7C4935}"/>
               </a:ext>
             </a:extLst>
           </p:cNvPr>
@@ -7355,7 +7362,7 @@
           <p:cNvPr id="11" name="TextBox 10">
             <a:extLst>
               <a:ext uri="{FF2B5EF4-FFF2-40B4-BE49-F238E27FC236}">
-                <a16:creationId xmlns:a16="http://schemas.microsoft.com/office/drawing/2014/main" id="{D7BB3F2F-FCCB-3A4D-83B7-12EFCA2F5EBE}"/>
+                <a16:creationId xmlns:a16="http://schemas.microsoft.com/office/drawing/2014/main" xmlns="" id="{D7BB3F2F-FCCB-3A4D-83B7-12EFCA2F5EBE}"/>
               </a:ext>
             </a:extLst>
           </p:cNvPr>
@@ -7391,7 +7398,7 @@
           <p:cNvPr id="12" name="TextBox 11">
             <a:extLst>
               <a:ext uri="{FF2B5EF4-FFF2-40B4-BE49-F238E27FC236}">
-                <a16:creationId xmlns:a16="http://schemas.microsoft.com/office/drawing/2014/main" id="{AD7C779C-95F0-5746-9F4A-63666D9DAA86}"/>
+                <a16:creationId xmlns:a16="http://schemas.microsoft.com/office/drawing/2014/main" xmlns="" id="{AD7C779C-95F0-5746-9F4A-63666D9DAA86}"/>
               </a:ext>
             </a:extLst>
           </p:cNvPr>
@@ -7804,7 +7811,7 @@
           <p:cNvPr id="2" name="Title 1">
             <a:extLst>
               <a:ext uri="{FF2B5EF4-FFF2-40B4-BE49-F238E27FC236}">
-                <a16:creationId xmlns:a16="http://schemas.microsoft.com/office/drawing/2014/main" id="{553D7AE0-7F1A-C34F-8A50-58DE17400BAB}"/>
+                <a16:creationId xmlns:a16="http://schemas.microsoft.com/office/drawing/2014/main" xmlns="" id="{553D7AE0-7F1A-C34F-8A50-58DE17400BAB}"/>
               </a:ext>
             </a:extLst>
           </p:cNvPr>
@@ -7832,7 +7839,7 @@
           <p:cNvPr id="4" name="Slide Number Placeholder 3">
             <a:extLst>
               <a:ext uri="{FF2B5EF4-FFF2-40B4-BE49-F238E27FC236}">
-                <a16:creationId xmlns:a16="http://schemas.microsoft.com/office/drawing/2014/main" id="{1940B822-519F-1341-99E5-38ED4793594B}"/>
+                <a16:creationId xmlns:a16="http://schemas.microsoft.com/office/drawing/2014/main" xmlns="" id="{1940B822-519F-1341-99E5-38ED4793594B}"/>
               </a:ext>
             </a:extLst>
           </p:cNvPr>
@@ -7870,7 +7877,7 @@
           <p:cNvPr id="13" name="Picture 12">
             <a:extLst>
               <a:ext uri="{FF2B5EF4-FFF2-40B4-BE49-F238E27FC236}">
-                <a16:creationId xmlns:a16="http://schemas.microsoft.com/office/drawing/2014/main" id="{0F74C423-65B0-2040-945F-2D342E55B19D}"/>
+                <a16:creationId xmlns:a16="http://schemas.microsoft.com/office/drawing/2014/main" xmlns="" id="{0F74C423-65B0-2040-945F-2D342E55B19D}"/>
               </a:ext>
             </a:extLst>
           </p:cNvPr>
@@ -7930,7 +7937,7 @@
           <p:cNvPr id="2" name="Title 1">
             <a:extLst>
               <a:ext uri="{FF2B5EF4-FFF2-40B4-BE49-F238E27FC236}">
-                <a16:creationId xmlns:a16="http://schemas.microsoft.com/office/drawing/2014/main" id="{553D7AE0-7F1A-C34F-8A50-58DE17400BAB}"/>
+                <a16:creationId xmlns:a16="http://schemas.microsoft.com/office/drawing/2014/main" xmlns="" id="{553D7AE0-7F1A-C34F-8A50-58DE17400BAB}"/>
               </a:ext>
             </a:extLst>
           </p:cNvPr>
@@ -7958,7 +7965,7 @@
           <p:cNvPr id="4" name="Slide Number Placeholder 3">
             <a:extLst>
               <a:ext uri="{FF2B5EF4-FFF2-40B4-BE49-F238E27FC236}">
-                <a16:creationId xmlns:a16="http://schemas.microsoft.com/office/drawing/2014/main" id="{1940B822-519F-1341-99E5-38ED4793594B}"/>
+                <a16:creationId xmlns:a16="http://schemas.microsoft.com/office/drawing/2014/main" xmlns="" id="{1940B822-519F-1341-99E5-38ED4793594B}"/>
               </a:ext>
             </a:extLst>
           </p:cNvPr>
@@ -7996,7 +8003,7 @@
           <p:cNvPr id="13" name="Picture 12">
             <a:extLst>
               <a:ext uri="{FF2B5EF4-FFF2-40B4-BE49-F238E27FC236}">
-                <a16:creationId xmlns:a16="http://schemas.microsoft.com/office/drawing/2014/main" id="{D3C1D3CD-A16B-9F49-B9A5-5977196D8F9F}"/>
+                <a16:creationId xmlns:a16="http://schemas.microsoft.com/office/drawing/2014/main" xmlns="" id="{D3C1D3CD-A16B-9F49-B9A5-5977196D8F9F}"/>
               </a:ext>
             </a:extLst>
           </p:cNvPr>
@@ -8056,7 +8063,7 @@
           <p:cNvPr id="2" name="Title 1">
             <a:extLst>
               <a:ext uri="{FF2B5EF4-FFF2-40B4-BE49-F238E27FC236}">
-                <a16:creationId xmlns:a16="http://schemas.microsoft.com/office/drawing/2014/main" id="{553D7AE0-7F1A-C34F-8A50-58DE17400BAB}"/>
+                <a16:creationId xmlns:a16="http://schemas.microsoft.com/office/drawing/2014/main" xmlns="" id="{553D7AE0-7F1A-C34F-8A50-58DE17400BAB}"/>
               </a:ext>
             </a:extLst>
           </p:cNvPr>
@@ -8084,7 +8091,7 @@
           <p:cNvPr id="4" name="Slide Number Placeholder 3">
             <a:extLst>
               <a:ext uri="{FF2B5EF4-FFF2-40B4-BE49-F238E27FC236}">
-                <a16:creationId xmlns:a16="http://schemas.microsoft.com/office/drawing/2014/main" id="{1940B822-519F-1341-99E5-38ED4793594B}"/>
+                <a16:creationId xmlns:a16="http://schemas.microsoft.com/office/drawing/2014/main" xmlns="" id="{1940B822-519F-1341-99E5-38ED4793594B}"/>
               </a:ext>
             </a:extLst>
           </p:cNvPr>
@@ -8122,7 +8129,7 @@
           <p:cNvPr id="5" name="Picture 4">
             <a:extLst>
               <a:ext uri="{FF2B5EF4-FFF2-40B4-BE49-F238E27FC236}">
-                <a16:creationId xmlns:a16="http://schemas.microsoft.com/office/drawing/2014/main" id="{C8BBC985-48C9-774D-936E-3BEC9D8BE01E}"/>
+                <a16:creationId xmlns:a16="http://schemas.microsoft.com/office/drawing/2014/main" xmlns="" id="{C8BBC985-48C9-774D-936E-3BEC9D8BE01E}"/>
               </a:ext>
             </a:extLst>
           </p:cNvPr>
@@ -8182,7 +8189,7 @@
           <p:cNvPr id="2" name="Title 1">
             <a:extLst>
               <a:ext uri="{FF2B5EF4-FFF2-40B4-BE49-F238E27FC236}">
-                <a16:creationId xmlns:a16="http://schemas.microsoft.com/office/drawing/2014/main" id="{553D7AE0-7F1A-C34F-8A50-58DE17400BAB}"/>
+                <a16:creationId xmlns:a16="http://schemas.microsoft.com/office/drawing/2014/main" xmlns="" id="{553D7AE0-7F1A-C34F-8A50-58DE17400BAB}"/>
               </a:ext>
             </a:extLst>
           </p:cNvPr>
@@ -8210,7 +8217,7 @@
           <p:cNvPr id="4" name="Slide Number Placeholder 3">
             <a:extLst>
               <a:ext uri="{FF2B5EF4-FFF2-40B4-BE49-F238E27FC236}">
-                <a16:creationId xmlns:a16="http://schemas.microsoft.com/office/drawing/2014/main" id="{1940B822-519F-1341-99E5-38ED4793594B}"/>
+                <a16:creationId xmlns:a16="http://schemas.microsoft.com/office/drawing/2014/main" xmlns="" id="{1940B822-519F-1341-99E5-38ED4793594B}"/>
               </a:ext>
             </a:extLst>
           </p:cNvPr>
@@ -8248,7 +8255,7 @@
           <p:cNvPr id="5" name="Picture 4">
             <a:extLst>
               <a:ext uri="{FF2B5EF4-FFF2-40B4-BE49-F238E27FC236}">
-                <a16:creationId xmlns:a16="http://schemas.microsoft.com/office/drawing/2014/main" id="{D36C44D1-2DCC-E14E-89CA-24EB60650548}"/>
+                <a16:creationId xmlns:a16="http://schemas.microsoft.com/office/drawing/2014/main" xmlns="" id="{D36C44D1-2DCC-E14E-89CA-24EB60650548}"/>
               </a:ext>
             </a:extLst>
           </p:cNvPr>

</xml_diff>